<commit_message>
new file:   ITA-base_practice_ja.pdf 	modified:   ITA-base_practice_ja.pptx
</commit_message>
<xml_diff>
--- a/asset/Learn_ja/ITA-base_practice_ja.pptx
+++ b/asset/Learn_ja/ITA-base_practice_ja.pptx
@@ -336,7 +336,7 @@
               <a:rPr kumimoji="1" lang="ja-JP" altLang="en-US" smtClean="0">
                 <a:ea typeface="メイリオ" panose="020B0604030504040204" pitchFamily="50" charset="-128"/>
               </a:rPr>
-              <a:t>2020/9/10</a:t>
+              <a:t>2021/2/4</a:t>
             </a:fld>
             <a:endParaRPr kumimoji="1" lang="ja-JP" altLang="en-US" dirty="0">
               <a:ea typeface="メイリオ" panose="020B0604030504040204" pitchFamily="50" charset="-128"/>
@@ -482,7 +482,7 @@
             <a:fld id="{4B26993D-C081-44EB-B0F5-A9F467792B62}" type="datetimeFigureOut">
               <a:rPr lang="ja-JP" altLang="en-US" smtClean="0"/>
               <a:pPr/>
-              <a:t>2020/9/10</a:t>
+              <a:t>2021/2/4</a:t>
             </a:fld>
             <a:endParaRPr lang="ja-JP" altLang="en-US" dirty="0"/>
           </a:p>
@@ -2744,7 +2744,7 @@
           <a:p>
             <a:fld id="{56F9016B-CCA6-43BE-8BEE-59565A35F4F7}" type="datetimeFigureOut">
               <a:rPr kumimoji="1" lang="ja-JP" altLang="en-US" smtClean="0"/>
-              <a:t>2020/9/10</a:t>
+              <a:t>2021/2/4</a:t>
             </a:fld>
             <a:endParaRPr kumimoji="1" lang="ja-JP" altLang="en-US"/>
           </a:p>
@@ -2946,7 +2946,7 @@
           <a:p>
             <a:fld id="{56F9016B-CCA6-43BE-8BEE-59565A35F4F7}" type="datetimeFigureOut">
               <a:rPr kumimoji="1" lang="ja-JP" altLang="en-US" smtClean="0"/>
-              <a:t>2020/9/10</a:t>
+              <a:t>2021/2/4</a:t>
             </a:fld>
             <a:endParaRPr kumimoji="1" lang="ja-JP" altLang="en-US"/>
           </a:p>
@@ -3192,7 +3192,7 @@
           <a:p>
             <a:fld id="{56F9016B-CCA6-43BE-8BEE-59565A35F4F7}" type="datetimeFigureOut">
               <a:rPr kumimoji="1" lang="ja-JP" altLang="en-US" smtClean="0"/>
-              <a:t>2020/9/10</a:t>
+              <a:t>2021/2/4</a:t>
             </a:fld>
             <a:endParaRPr kumimoji="1" lang="ja-JP" altLang="en-US"/>
           </a:p>
@@ -3488,7 +3488,7 @@
           <a:p>
             <a:fld id="{56F9016B-CCA6-43BE-8BEE-59565A35F4F7}" type="datetimeFigureOut">
               <a:rPr kumimoji="1" lang="ja-JP" altLang="en-US" smtClean="0"/>
-              <a:t>2020/9/10</a:t>
+              <a:t>2021/2/4</a:t>
             </a:fld>
             <a:endParaRPr kumimoji="1" lang="ja-JP" altLang="en-US"/>
           </a:p>
@@ -3919,7 +3919,7 @@
           <a:p>
             <a:fld id="{56F9016B-CCA6-43BE-8BEE-59565A35F4F7}" type="datetimeFigureOut">
               <a:rPr kumimoji="1" lang="ja-JP" altLang="en-US" smtClean="0"/>
-              <a:t>2020/9/10</a:t>
+              <a:t>2021/2/4</a:t>
             </a:fld>
             <a:endParaRPr kumimoji="1" lang="ja-JP" altLang="en-US"/>
           </a:p>
@@ -4037,7 +4037,7 @@
           <a:p>
             <a:fld id="{56F9016B-CCA6-43BE-8BEE-59565A35F4F7}" type="datetimeFigureOut">
               <a:rPr kumimoji="1" lang="ja-JP" altLang="en-US" smtClean="0"/>
-              <a:t>2020/9/10</a:t>
+              <a:t>2021/2/4</a:t>
             </a:fld>
             <a:endParaRPr kumimoji="1" lang="ja-JP" altLang="en-US"/>
           </a:p>
@@ -4132,7 +4132,7 @@
           <a:p>
             <a:fld id="{56F9016B-CCA6-43BE-8BEE-59565A35F4F7}" type="datetimeFigureOut">
               <a:rPr kumimoji="1" lang="ja-JP" altLang="en-US" smtClean="0"/>
-              <a:t>2020/9/10</a:t>
+              <a:t>2021/2/4</a:t>
             </a:fld>
             <a:endParaRPr kumimoji="1" lang="ja-JP" altLang="en-US"/>
           </a:p>
@@ -4441,7 +4441,7 @@
           <a:p>
             <a:fld id="{56F9016B-CCA6-43BE-8BEE-59565A35F4F7}" type="datetimeFigureOut">
               <a:rPr kumimoji="1" lang="ja-JP" altLang="en-US" smtClean="0"/>
-              <a:t>2020/9/10</a:t>
+              <a:t>2021/2/4</a:t>
             </a:fld>
             <a:endParaRPr kumimoji="1" lang="ja-JP" altLang="en-US"/>
           </a:p>
@@ -4694,7 +4694,7 @@
           <a:p>
             <a:fld id="{56F9016B-CCA6-43BE-8BEE-59565A35F4F7}" type="datetimeFigureOut">
               <a:rPr kumimoji="1" lang="ja-JP" altLang="en-US" smtClean="0"/>
-              <a:t>2020/9/10</a:t>
+              <a:t>2021/2/4</a:t>
             </a:fld>
             <a:endParaRPr kumimoji="1" lang="ja-JP" altLang="en-US"/>
           </a:p>
@@ -4971,7 +4971,7 @@
           <a:p>
             <a:fld id="{56F9016B-CCA6-43BE-8BEE-59565A35F4F7}" type="datetimeFigureOut">
               <a:rPr kumimoji="1" lang="ja-JP" altLang="en-US" smtClean="0"/>
-              <a:t>2020/9/10</a:t>
+              <a:t>2021/2/4</a:t>
             </a:fld>
             <a:endParaRPr kumimoji="1" lang="ja-JP" altLang="en-US"/>
           </a:p>
@@ -5183,7 +5183,7 @@
           <a:p>
             <a:fld id="{56F9016B-CCA6-43BE-8BEE-59565A35F4F7}" type="datetimeFigureOut">
               <a:rPr kumimoji="1" lang="ja-JP" altLang="en-US" smtClean="0"/>
-              <a:t>2020/9/10</a:t>
+              <a:t>2021/2/4</a:t>
             </a:fld>
             <a:endParaRPr kumimoji="1" lang="ja-JP" altLang="en-US"/>
           </a:p>
@@ -8242,7 +8242,7 @@
           <a:p>
             <a:fld id="{56F9016B-CCA6-43BE-8BEE-59565A35F4F7}" type="datetimeFigureOut">
               <a:rPr kumimoji="1" lang="ja-JP" altLang="en-US" smtClean="0"/>
-              <a:t>2020/9/10</a:t>
+              <a:t>2021/2/4</a:t>
             </a:fld>
             <a:endParaRPr kumimoji="1" lang="ja-JP" altLang="en-US"/>
           </a:p>
@@ -13241,28 +13241,22 @@
       </p:grpSpPr>
       <p:pic>
         <p:nvPicPr>
-          <p:cNvPr id="6" name="図 5"/>
+          <p:cNvPr id="5" name="図 4"/>
           <p:cNvPicPr>
             <a:picLocks noChangeAspect="1"/>
           </p:cNvPicPr>
           <p:nvPr/>
         </p:nvPicPr>
         <p:blipFill>
-          <a:blip r:embed="rId2">
-            <a:extLst>
-              <a:ext uri="{28A0092B-C50C-407E-A947-70E740481C1C}">
-                <a14:useLocalDpi xmlns:a14="http://schemas.microsoft.com/office/drawing/2010/main" val="0"/>
-              </a:ext>
-            </a:extLst>
-          </a:blip>
+          <a:blip r:embed="rId2"/>
           <a:stretch>
             <a:fillRect/>
           </a:stretch>
         </p:blipFill>
         <p:spPr>
           <a:xfrm>
-            <a:off x="446531" y="1939237"/>
-            <a:ext cx="6201915" cy="3434033"/>
+            <a:off x="251400" y="1849610"/>
+            <a:ext cx="6200775" cy="3429000"/>
           </a:xfrm>
           <a:prstGeom prst="rect">
             <a:avLst/>
@@ -14436,6 +14430,30 @@
           <a:chExt cx="0" cy="0"/>
         </a:xfrm>
       </p:grpSpPr>
+      <p:pic>
+        <p:nvPicPr>
+          <p:cNvPr id="5" name="図 4"/>
+          <p:cNvPicPr>
+            <a:picLocks noChangeAspect="1"/>
+          </p:cNvPicPr>
+          <p:nvPr/>
+        </p:nvPicPr>
+        <p:blipFill>
+          <a:blip r:embed="rId2"/>
+          <a:stretch>
+            <a:fillRect/>
+          </a:stretch>
+        </p:blipFill>
+        <p:spPr>
+          <a:xfrm>
+            <a:off x="884934" y="1995297"/>
+            <a:ext cx="5334000" cy="4238625"/>
+          </a:xfrm>
+          <a:prstGeom prst="rect">
+            <a:avLst/>
+          </a:prstGeom>
+        </p:spPr>
+      </p:pic>
       <p:sp>
         <p:nvSpPr>
           <p:cNvPr id="2" name="タイトル 1"/>
@@ -14571,35 +14589,6 @@
           </a:p>
         </p:txBody>
       </p:sp>
-      <p:pic>
-        <p:nvPicPr>
-          <p:cNvPr id="4" name="図 3"/>
-          <p:cNvPicPr>
-            <a:picLocks noChangeAspect="1"/>
-          </p:cNvPicPr>
-          <p:nvPr/>
-        </p:nvPicPr>
-        <p:blipFill rotWithShape="1">
-          <a:blip r:embed="rId2">
-            <a:extLst>
-              <a:ext uri="{28A0092B-C50C-407E-A947-70E740481C1C}">
-                <a14:useLocalDpi xmlns:a14="http://schemas.microsoft.com/office/drawing/2010/main" val="0"/>
-              </a:ext>
-            </a:extLst>
-          </a:blip>
-          <a:srcRect r="28102"/>
-          <a:stretch/>
-        </p:blipFill>
-        <p:spPr>
-          <a:xfrm>
-            <a:off x="897801" y="2011525"/>
-            <a:ext cx="5332477" cy="4241598"/>
-          </a:xfrm>
-          <a:prstGeom prst="rect">
-            <a:avLst/>
-          </a:prstGeom>
-        </p:spPr>
-      </p:pic>
       <p:sp>
         <p:nvSpPr>
           <p:cNvPr id="12" name="角丸四角形 11"/>
@@ -37754,6 +37743,30 @@
           <a:chExt cx="0" cy="0"/>
         </a:xfrm>
       </p:grpSpPr>
+      <p:pic>
+        <p:nvPicPr>
+          <p:cNvPr id="3" name="図 2"/>
+          <p:cNvPicPr>
+            <a:picLocks noChangeAspect="1"/>
+          </p:cNvPicPr>
+          <p:nvPr/>
+        </p:nvPicPr>
+        <p:blipFill>
+          <a:blip r:embed="rId3"/>
+          <a:stretch>
+            <a:fillRect/>
+          </a:stretch>
+        </p:blipFill>
+        <p:spPr>
+          <a:xfrm>
+            <a:off x="776522" y="2505031"/>
+            <a:ext cx="2981308" cy="3415984"/>
+          </a:xfrm>
+          <a:prstGeom prst="rect">
+            <a:avLst/>
+          </a:prstGeom>
+        </p:spPr>
+      </p:pic>
       <p:sp>
         <p:nvSpPr>
           <p:cNvPr id="2" name="タイトル 1"/>
@@ -37976,36 +37989,6 @@
           </a:p>
         </p:txBody>
       </p:sp>
-      <p:pic>
-        <p:nvPicPr>
-          <p:cNvPr id="11" name="図 10"/>
-          <p:cNvPicPr>
-            <a:picLocks noChangeAspect="1"/>
-          </p:cNvPicPr>
-          <p:nvPr/>
-        </p:nvPicPr>
-        <p:blipFill>
-          <a:blip r:embed="rId3">
-            <a:extLst>
-              <a:ext uri="{28A0092B-C50C-407E-A947-70E740481C1C}">
-                <a14:useLocalDpi xmlns:a14="http://schemas.microsoft.com/office/drawing/2010/main" val="0"/>
-              </a:ext>
-            </a:extLst>
-          </a:blip>
-          <a:stretch>
-            <a:fillRect/>
-          </a:stretch>
-        </p:blipFill>
-        <p:spPr>
-          <a:xfrm>
-            <a:off x="755470" y="2444097"/>
-            <a:ext cx="3019912" cy="3465058"/>
-          </a:xfrm>
-          <a:prstGeom prst="rect">
-            <a:avLst/>
-          </a:prstGeom>
-        </p:spPr>
-      </p:pic>
       <p:sp>
         <p:nvSpPr>
           <p:cNvPr id="5" name="角丸四角形 4"/>
@@ -38014,8 +37997,8 @@
         </p:nvSpPr>
         <p:spPr bwMode="auto">
           <a:xfrm>
-            <a:off x="801408" y="3801467"/>
-            <a:ext cx="936000" cy="144000"/>
+            <a:off x="801408" y="3858169"/>
+            <a:ext cx="936000" cy="130909"/>
           </a:xfrm>
           <a:prstGeom prst="roundRect">
             <a:avLst>
@@ -39584,8 +39567,8 @@
         </p:nvSpPr>
         <p:spPr bwMode="auto">
           <a:xfrm>
-            <a:off x="1878422" y="3431387"/>
-            <a:ext cx="2556000" cy="992502"/>
+            <a:off x="1878422" y="3526657"/>
+            <a:ext cx="2556000" cy="902275"/>
           </a:xfrm>
           <a:prstGeom prst="roundRect">
             <a:avLst>
@@ -39630,8 +39613,8 @@
         </p:nvSpPr>
         <p:spPr bwMode="auto">
           <a:xfrm>
-            <a:off x="1831111" y="3401704"/>
-            <a:ext cx="301542" cy="312200"/>
+            <a:off x="1831111" y="3466051"/>
+            <a:ext cx="301542" cy="283818"/>
           </a:xfrm>
           <a:prstGeom prst="wedgeEllipseCallout">
             <a:avLst>
@@ -39690,13 +39673,13 @@
           <p:nvPr>
             <p:extLst>
               <p:ext uri="{D42A27DB-BD31-4B8C-83A1-F6EECF244321}">
-                <p14:modId xmlns:p14="http://schemas.microsoft.com/office/powerpoint/2010/main" val="1569805674"/>
+                <p14:modId xmlns:p14="http://schemas.microsoft.com/office/powerpoint/2010/main" val="1202550189"/>
               </p:ext>
             </p:extLst>
           </p:nvPr>
         </p:nvGraphicFramePr>
         <p:xfrm>
-          <a:off x="2042642" y="3775156"/>
+          <a:off x="2042642" y="3845262"/>
           <a:ext cx="2298002" cy="548640"/>
         </p:xfrm>
         <a:graphic>

</xml_diff>